<commit_message>
Hibás dia javítása (Nem volt formázva)
((köszi gábor hogy megcsináltad))
</commit_message>
<xml_diff>
--- a/cad_cam_adv.pptx
+++ b/cad_cam_adv.pptx
@@ -661,7 +661,7 @@
           <a:p>
             <a:fld id="{846CE7D5-CF57-46EF-B807-FDD0502418D4}" type="datetimeFigureOut">
               <a:rPr lang="en-US" smtClean="0"/>
-              <a:t>11/15/2023</a:t>
+              <a:t>11/20/2023</a:t>
             </a:fld>
             <a:endParaRPr lang="en-US"/>
           </a:p>
@@ -829,7 +829,7 @@
           <a:p>
             <a:fld id="{846CE7D5-CF57-46EF-B807-FDD0502418D4}" type="datetimeFigureOut">
               <a:rPr lang="en-US" smtClean="0"/>
-              <a:t>11/15/2023</a:t>
+              <a:t>11/20/2023</a:t>
             </a:fld>
             <a:endParaRPr lang="en-US"/>
           </a:p>
@@ -1007,7 +1007,7 @@
           <a:p>
             <a:fld id="{846CE7D5-CF57-46EF-B807-FDD0502418D4}" type="datetimeFigureOut">
               <a:rPr lang="en-US" smtClean="0"/>
-              <a:t>11/15/2023</a:t>
+              <a:t>11/20/2023</a:t>
             </a:fld>
             <a:endParaRPr lang="en-US"/>
           </a:p>
@@ -1175,7 +1175,7 @@
           <a:p>
             <a:fld id="{846CE7D5-CF57-46EF-B807-FDD0502418D4}" type="datetimeFigureOut">
               <a:rPr lang="en-US" smtClean="0"/>
-              <a:t>11/15/2023</a:t>
+              <a:t>11/20/2023</a:t>
             </a:fld>
             <a:endParaRPr lang="en-US"/>
           </a:p>
@@ -1420,7 +1420,7 @@
           <a:p>
             <a:fld id="{846CE7D5-CF57-46EF-B807-FDD0502418D4}" type="datetimeFigureOut">
               <a:rPr lang="en-US" smtClean="0"/>
-              <a:t>11/15/2023</a:t>
+              <a:t>11/20/2023</a:t>
             </a:fld>
             <a:endParaRPr lang="en-US"/>
           </a:p>
@@ -1649,7 +1649,7 @@
           <a:p>
             <a:fld id="{846CE7D5-CF57-46EF-B807-FDD0502418D4}" type="datetimeFigureOut">
               <a:rPr lang="en-US" smtClean="0"/>
-              <a:t>11/15/2023</a:t>
+              <a:t>11/20/2023</a:t>
             </a:fld>
             <a:endParaRPr lang="en-US"/>
           </a:p>
@@ -2013,7 +2013,7 @@
           <a:p>
             <a:fld id="{846CE7D5-CF57-46EF-B807-FDD0502418D4}" type="datetimeFigureOut">
               <a:rPr lang="en-US" smtClean="0"/>
-              <a:t>11/15/2023</a:t>
+              <a:t>11/20/2023</a:t>
             </a:fld>
             <a:endParaRPr lang="en-US"/>
           </a:p>
@@ -2130,7 +2130,7 @@
           <a:p>
             <a:fld id="{846CE7D5-CF57-46EF-B807-FDD0502418D4}" type="datetimeFigureOut">
               <a:rPr lang="en-US" smtClean="0"/>
-              <a:t>11/15/2023</a:t>
+              <a:t>11/20/2023</a:t>
             </a:fld>
             <a:endParaRPr lang="en-US"/>
           </a:p>
@@ -2225,7 +2225,7 @@
           <a:p>
             <a:fld id="{846CE7D5-CF57-46EF-B807-FDD0502418D4}" type="datetimeFigureOut">
               <a:rPr lang="en-US" smtClean="0"/>
-              <a:t>11/15/2023</a:t>
+              <a:t>11/20/2023</a:t>
             </a:fld>
             <a:endParaRPr lang="en-US"/>
           </a:p>
@@ -2500,7 +2500,7 @@
           <a:p>
             <a:fld id="{846CE7D5-CF57-46EF-B807-FDD0502418D4}" type="datetimeFigureOut">
               <a:rPr lang="en-US" smtClean="0"/>
-              <a:t>11/15/2023</a:t>
+              <a:t>11/20/2023</a:t>
             </a:fld>
             <a:endParaRPr lang="en-US"/>
           </a:p>
@@ -2755,7 +2755,7 @@
           <a:p>
             <a:fld id="{846CE7D5-CF57-46EF-B807-FDD0502418D4}" type="datetimeFigureOut">
               <a:rPr lang="en-US" smtClean="0"/>
-              <a:t>11/15/2023</a:t>
+              <a:t>11/20/2023</a:t>
             </a:fld>
             <a:endParaRPr lang="en-US"/>
           </a:p>
@@ -2993,7 +2993,7 @@
           <a:p>
             <a:fld id="{846CE7D5-CF57-46EF-B807-FDD0502418D4}" type="datetimeFigureOut">
               <a:rPr lang="en-US" smtClean="0"/>
-              <a:t>11/15/2023</a:t>
+              <a:t>11/20/2023</a:t>
             </a:fld>
             <a:endParaRPr lang="en-US"/>
           </a:p>
@@ -3715,6 +3715,13 @@
                 <a:solidFill>
                   <a:schemeClr val="bg1"/>
                 </a:solidFill>
+                <a:effectLst>
+                  <a:outerShdw blurRad="38100" dist="38100" dir="2700000" algn="tl">
+                    <a:srgbClr val="000000">
+                      <a:alpha val="43137"/>
+                    </a:srgbClr>
+                  </a:outerShdw>
+                </a:effectLst>
               </a:rPr>
               <a:t>Fogyasztás:</a:t>
             </a:r>
@@ -3722,6 +3729,13 @@
               <a:solidFill>
                 <a:schemeClr val="bg1"/>
               </a:solidFill>
+              <a:effectLst>
+                <a:outerShdw blurRad="38100" dist="38100" dir="2700000" algn="tl">
+                  <a:srgbClr val="000000">
+                    <a:alpha val="43137"/>
+                  </a:srgbClr>
+                </a:outerShdw>
+              </a:effectLst>
             </a:endParaRPr>
           </a:p>
         </p:txBody>
@@ -3757,6 +3771,13 @@
                 <a:solidFill>
                   <a:schemeClr val="bg1"/>
                 </a:solidFill>
+                <a:effectLst>
+                  <a:outerShdw blurRad="38100" dist="38100" dir="2700000" algn="tl">
+                    <a:srgbClr val="000000">
+                      <a:alpha val="43137"/>
+                    </a:srgbClr>
+                  </a:outerShdw>
+                </a:effectLst>
               </a:rPr>
               <a:t>Fogyasztás kiszámításának a menete:</a:t>
             </a:r>
@@ -3771,6 +3792,13 @@
                 <a:solidFill>
                   <a:schemeClr val="bg1"/>
                 </a:solidFill>
+                <a:effectLst>
+                  <a:outerShdw blurRad="38100" dist="38100" dir="2700000" algn="tl">
+                    <a:srgbClr val="000000">
+                      <a:alpha val="43137"/>
+                    </a:srgbClr>
+                  </a:outerShdw>
+                </a:effectLst>
               </a:rPr>
               <a:t>Összeadjuk a komponensek áramfelhasználtságát</a:t>
             </a:r>
@@ -3785,6 +3813,13 @@
                 <a:solidFill>
                   <a:schemeClr val="bg1"/>
                 </a:solidFill>
+                <a:effectLst>
+                  <a:outerShdw blurRad="38100" dist="38100" dir="2700000" algn="tl">
+                    <a:srgbClr val="000000">
+                      <a:alpha val="43137"/>
+                    </a:srgbClr>
+                  </a:outerShdw>
+                </a:effectLst>
               </a:rPr>
               <a:t>20-25%-</a:t>
             </a:r>
@@ -3793,6 +3828,13 @@
                 <a:solidFill>
                   <a:schemeClr val="bg1"/>
                 </a:solidFill>
+                <a:effectLst>
+                  <a:outerShdw blurRad="38100" dist="38100" dir="2700000" algn="tl">
+                    <a:srgbClr val="000000">
+                      <a:alpha val="43137"/>
+                    </a:srgbClr>
+                  </a:outerShdw>
+                </a:effectLst>
               </a:rPr>
               <a:t>kal</a:t>
             </a:r>
@@ -3801,12 +3843,49 @@
                 <a:solidFill>
                   <a:schemeClr val="bg1"/>
                 </a:solidFill>
+                <a:effectLst>
+                  <a:outerShdw blurRad="38100" dist="38100" dir="2700000" algn="tl">
+                    <a:srgbClr val="000000">
+                      <a:alpha val="43137"/>
+                    </a:srgbClr>
+                  </a:outerShdw>
+                </a:effectLst>
               </a:rPr>
               <a:t> nagyobb teljesítményű tápot veszünk</a:t>
             </a:r>
           </a:p>
         </p:txBody>
       </p:sp>
+      <p:pic>
+        <p:nvPicPr>
+          <p:cNvPr id="2" name="Kép 1"/>
+          <p:cNvPicPr>
+            <a:picLocks noChangeAspect="1"/>
+          </p:cNvPicPr>
+          <p:nvPr/>
+        </p:nvPicPr>
+        <p:blipFill>
+          <a:blip r:embed="rId2">
+            <a:extLst>
+              <a:ext uri="{28A0092B-C50C-407E-A947-70E740481C1C}">
+                <a14:useLocalDpi xmlns:a14="http://schemas.microsoft.com/office/drawing/2010/main" val="0"/>
+              </a:ext>
+            </a:extLst>
+          </a:blip>
+          <a:stretch>
+            <a:fillRect/>
+          </a:stretch>
+        </p:blipFill>
+        <p:spPr>
+          <a:xfrm>
+            <a:off x="881178" y="2828111"/>
+            <a:ext cx="11006021" cy="3637125"/>
+          </a:xfrm>
+          <a:prstGeom prst="rect">
+            <a:avLst/>
+          </a:prstGeom>
+        </p:spPr>
+      </p:pic>
     </p:spTree>
     <p:extLst>
       <p:ext uri="{BB962C8B-B14F-4D97-AF65-F5344CB8AC3E}">
@@ -4405,8 +4484,10 @@
                   </a:outerShdw>
                 </a:effectLst>
               </a:rPr>
-              <a:t>	• </a:t>
-            </a:r>
+              <a:t>	• Hosszú használat után problémák léphetnek fel vele.</a:t>
+            </a:r>
+          </a:p>
+          <a:p>
             <a:r>
               <a:rPr lang="hu-HU" sz="2800" dirty="0" smtClean="0">
                 <a:solidFill>
@@ -4420,7 +4501,22 @@
                   </a:outerShdw>
                 </a:effectLst>
               </a:rPr>
-              <a:t>Hosszú használat után problémák léphetnek fel vele.</a:t>
+              <a:t>	• Néhány </a:t>
+            </a:r>
+            <a:r>
+              <a:rPr lang="hu-HU" sz="2800" dirty="0">
+                <a:solidFill>
+                  <a:schemeClr val="bg1"/>
+                </a:solidFill>
+                <a:effectLst>
+                  <a:outerShdw blurRad="38100" dist="38100" dir="2700000" algn="tl">
+                    <a:srgbClr val="000000">
+                      <a:alpha val="43137"/>
+                    </a:srgbClr>
+                  </a:outerShdw>
+                </a:effectLst>
+              </a:rPr>
+              <a:t>évente cserélendő</a:t>
             </a:r>
           </a:p>
           <a:p>
@@ -4437,69 +4533,7 @@
                   </a:outerShdw>
                 </a:effectLst>
               </a:rPr>
-              <a:t>	• </a:t>
-            </a:r>
-            <a:r>
-              <a:rPr lang="hu-HU" sz="2800" dirty="0" smtClean="0">
-                <a:solidFill>
-                  <a:schemeClr val="bg1"/>
-                </a:solidFill>
-                <a:effectLst>
-                  <a:outerShdw blurRad="38100" dist="38100" dir="2700000" algn="tl">
-                    <a:srgbClr val="000000">
-                      <a:alpha val="43137"/>
-                    </a:srgbClr>
-                  </a:outerShdw>
-                </a:effectLst>
-              </a:rPr>
-              <a:t>Néhány </a:t>
-            </a:r>
-            <a:r>
-              <a:rPr lang="hu-HU" sz="2800" dirty="0">
-                <a:solidFill>
-                  <a:schemeClr val="bg1"/>
-                </a:solidFill>
-                <a:effectLst>
-                  <a:outerShdw blurRad="38100" dist="38100" dir="2700000" algn="tl">
-                    <a:srgbClr val="000000">
-                      <a:alpha val="43137"/>
-                    </a:srgbClr>
-                  </a:outerShdw>
-                </a:effectLst>
-              </a:rPr>
-              <a:t>évente cserélendő</a:t>
-            </a:r>
-          </a:p>
-          <a:p>
-            <a:r>
-              <a:rPr lang="hu-HU" sz="2800" dirty="0" smtClean="0">
-                <a:solidFill>
-                  <a:schemeClr val="bg1"/>
-                </a:solidFill>
-                <a:effectLst>
-                  <a:outerShdw blurRad="38100" dist="38100" dir="2700000" algn="tl">
-                    <a:srgbClr val="000000">
-                      <a:alpha val="43137"/>
-                    </a:srgbClr>
-                  </a:outerShdw>
-                </a:effectLst>
-              </a:rPr>
-              <a:t>	• </a:t>
-            </a:r>
-            <a:r>
-              <a:rPr lang="hu-HU" sz="2800" dirty="0" smtClean="0">
-                <a:solidFill>
-                  <a:schemeClr val="bg1"/>
-                </a:solidFill>
-                <a:effectLst>
-                  <a:outerShdw blurRad="38100" dist="38100" dir="2700000" algn="tl">
-                    <a:srgbClr val="000000">
-                      <a:alpha val="43137"/>
-                    </a:srgbClr>
-                  </a:outerShdw>
-                </a:effectLst>
-              </a:rPr>
-              <a:t>Kerüljük </a:t>
+              <a:t>	• Kerüljük </a:t>
             </a:r>
             <a:r>
               <a:rPr lang="hu-HU" sz="2800" dirty="0">
@@ -8029,37 +8063,8 @@
                 </a:effectLst>
                 <a:cs typeface="Times New Roman"/>
               </a:rPr>
-              <a:t>Egy v8-as </a:t>
-            </a:r>
-            <a:r>
-              <a:rPr lang="hu-HU" sz="3200" dirty="0" smtClean="0">
-                <a:solidFill>
-                  <a:schemeClr val="bg1"/>
-                </a:solidFill>
-                <a:effectLst>
-                  <a:outerShdw blurRad="38100" dist="38100" dir="2700000" algn="tl">
-                    <a:srgbClr val="000000">
-                      <a:alpha val="43137"/>
-                    </a:srgbClr>
-                  </a:outerShdw>
-                </a:effectLst>
-                <a:cs typeface="Times New Roman"/>
-              </a:rPr>
-              <a:t>autómotor</a:t>
-            </a:r>
-            <a:endParaRPr lang="hu-HU" sz="3200" dirty="0" smtClean="0">
-              <a:solidFill>
-                <a:schemeClr val="bg1"/>
-              </a:solidFill>
-              <a:effectLst>
-                <a:outerShdw blurRad="38100" dist="38100" dir="2700000" algn="tl">
-                  <a:srgbClr val="000000">
-                    <a:alpha val="43137"/>
-                  </a:srgbClr>
-                </a:outerShdw>
-              </a:effectLst>
-              <a:cs typeface="Times New Roman"/>
-            </a:endParaRPr>
+              <a:t>Egy v8-as autómotor</a:t>
+            </a:r>
           </a:p>
         </p:txBody>
       </p:sp>

</xml_diff>